<commit_message>
marked slides with circle, will add example slides in a bit
</commit_message>
<xml_diff>
--- a/Presentation2/The Lomb-Scargle Algorithm-v2.pptx
+++ b/Presentation2/The Lomb-Scargle Algorithm-v2.pptx
@@ -275,7 +275,7 @@
           <a:p>
             <a:fld id="{9EB1C19C-B5D7-48B6-AE04-3DE84387D732}" type="datetimeFigureOut">
               <a:rPr lang="en-CA" smtClean="0"/>
-              <a:t>2018-02-26</a:t>
+              <a:t>2018-02-28</a:t>
             </a:fld>
             <a:endParaRPr lang="en-CA"/>
           </a:p>
@@ -475,7 +475,7 @@
           <a:p>
             <a:fld id="{9EB1C19C-B5D7-48B6-AE04-3DE84387D732}" type="datetimeFigureOut">
               <a:rPr lang="en-CA" smtClean="0"/>
-              <a:t>2018-02-26</a:t>
+              <a:t>2018-02-28</a:t>
             </a:fld>
             <a:endParaRPr lang="en-CA"/>
           </a:p>
@@ -685,7 +685,7 @@
           <a:p>
             <a:fld id="{9EB1C19C-B5D7-48B6-AE04-3DE84387D732}" type="datetimeFigureOut">
               <a:rPr lang="en-CA" smtClean="0"/>
-              <a:t>2018-02-26</a:t>
+              <a:t>2018-02-28</a:t>
             </a:fld>
             <a:endParaRPr lang="en-CA"/>
           </a:p>
@@ -885,7 +885,7 @@
           <a:p>
             <a:fld id="{9EB1C19C-B5D7-48B6-AE04-3DE84387D732}" type="datetimeFigureOut">
               <a:rPr lang="en-CA" smtClean="0"/>
-              <a:t>2018-02-26</a:t>
+              <a:t>2018-02-28</a:t>
             </a:fld>
             <a:endParaRPr lang="en-CA"/>
           </a:p>
@@ -1161,7 +1161,7 @@
           <a:p>
             <a:fld id="{9EB1C19C-B5D7-48B6-AE04-3DE84387D732}" type="datetimeFigureOut">
               <a:rPr lang="en-CA" smtClean="0"/>
-              <a:t>2018-02-26</a:t>
+              <a:t>2018-02-28</a:t>
             </a:fld>
             <a:endParaRPr lang="en-CA"/>
           </a:p>
@@ -1429,7 +1429,7 @@
           <a:p>
             <a:fld id="{9EB1C19C-B5D7-48B6-AE04-3DE84387D732}" type="datetimeFigureOut">
               <a:rPr lang="en-CA" smtClean="0"/>
-              <a:t>2018-02-26</a:t>
+              <a:t>2018-02-28</a:t>
             </a:fld>
             <a:endParaRPr lang="en-CA"/>
           </a:p>
@@ -1844,7 +1844,7 @@
           <a:p>
             <a:fld id="{9EB1C19C-B5D7-48B6-AE04-3DE84387D732}" type="datetimeFigureOut">
               <a:rPr lang="en-CA" smtClean="0"/>
-              <a:t>2018-02-26</a:t>
+              <a:t>2018-02-28</a:t>
             </a:fld>
             <a:endParaRPr lang="en-CA"/>
           </a:p>
@@ -1986,7 +1986,7 @@
           <a:p>
             <a:fld id="{9EB1C19C-B5D7-48B6-AE04-3DE84387D732}" type="datetimeFigureOut">
               <a:rPr lang="en-CA" smtClean="0"/>
-              <a:t>2018-02-26</a:t>
+              <a:t>2018-02-28</a:t>
             </a:fld>
             <a:endParaRPr lang="en-CA"/>
           </a:p>
@@ -2099,7 +2099,7 @@
           <a:p>
             <a:fld id="{9EB1C19C-B5D7-48B6-AE04-3DE84387D732}" type="datetimeFigureOut">
               <a:rPr lang="en-CA" smtClean="0"/>
-              <a:t>2018-02-26</a:t>
+              <a:t>2018-02-28</a:t>
             </a:fld>
             <a:endParaRPr lang="en-CA"/>
           </a:p>
@@ -2412,7 +2412,7 @@
           <a:p>
             <a:fld id="{9EB1C19C-B5D7-48B6-AE04-3DE84387D732}" type="datetimeFigureOut">
               <a:rPr lang="en-CA" smtClean="0"/>
-              <a:t>2018-02-26</a:t>
+              <a:t>2018-02-28</a:t>
             </a:fld>
             <a:endParaRPr lang="en-CA"/>
           </a:p>
@@ -2701,7 +2701,7 @@
           <a:p>
             <a:fld id="{9EB1C19C-B5D7-48B6-AE04-3DE84387D732}" type="datetimeFigureOut">
               <a:rPr lang="en-CA" smtClean="0"/>
-              <a:t>2018-02-26</a:t>
+              <a:t>2018-02-28</a:t>
             </a:fld>
             <a:endParaRPr lang="en-CA"/>
           </a:p>
@@ -2944,7 +2944,7 @@
           <a:p>
             <a:fld id="{9EB1C19C-B5D7-48B6-AE04-3DE84387D732}" type="datetimeFigureOut">
               <a:rPr lang="en-CA" smtClean="0"/>
-              <a:t>2018-02-26</a:t>
+              <a:t>2018-02-28</a:t>
             </a:fld>
             <a:endParaRPr lang="en-CA"/>
           </a:p>
@@ -3671,6 +3671,56 @@
           </a:p>
         </p:txBody>
       </p:sp>
+      <p:sp>
+        <p:nvSpPr>
+          <p:cNvPr id="4" name="Circle: Hollow 3">
+            <a:extLst>
+              <a:ext uri="{FF2B5EF4-FFF2-40B4-BE49-F238E27FC236}">
+                <a16:creationId xmlns:a16="http://schemas.microsoft.com/office/drawing/2014/main" id="{0FA1B659-B102-4046-9AFF-0BE890B363D2}"/>
+              </a:ext>
+            </a:extLst>
+          </p:cNvPr>
+          <p:cNvSpPr/>
+          <p:nvPr/>
+        </p:nvSpPr>
+        <p:spPr>
+          <a:xfrm>
+            <a:off x="96253" y="6416842"/>
+            <a:ext cx="320842" cy="320842"/>
+          </a:xfrm>
+          <a:prstGeom prst="donut">
+            <a:avLst/>
+          </a:prstGeom>
+        </p:spPr>
+        <p:style>
+          <a:lnRef idx="2">
+            <a:schemeClr val="accent1">
+              <a:shade val="50000"/>
+            </a:schemeClr>
+          </a:lnRef>
+          <a:fillRef idx="1">
+            <a:schemeClr val="accent1"/>
+          </a:fillRef>
+          <a:effectRef idx="0">
+            <a:schemeClr val="accent1"/>
+          </a:effectRef>
+          <a:fontRef idx="minor">
+            <a:schemeClr val="lt1"/>
+          </a:fontRef>
+        </p:style>
+        <p:txBody>
+          <a:bodyPr rtlCol="0" anchor="ctr"/>
+          <a:lstStyle/>
+          <a:p>
+            <a:pPr algn="ctr"/>
+            <a:endParaRPr lang="en-CA">
+              <a:solidFill>
+                <a:schemeClr val="tx1"/>
+              </a:solidFill>
+            </a:endParaRPr>
+          </a:p>
+        </p:txBody>
+      </p:sp>
     </p:spTree>
     <p:extLst>
       <p:ext uri="{BB962C8B-B14F-4D97-AF65-F5344CB8AC3E}">
@@ -4868,6 +4918,56 @@
           </a:p>
         </p:txBody>
       </p:sp>
+      <p:sp>
+        <p:nvSpPr>
+          <p:cNvPr id="4" name="Circle: Hollow 3">
+            <a:extLst>
+              <a:ext uri="{FF2B5EF4-FFF2-40B4-BE49-F238E27FC236}">
+                <a16:creationId xmlns:a16="http://schemas.microsoft.com/office/drawing/2014/main" id="{B980A34C-58EA-4BD4-BF8A-411C412B75E9}"/>
+              </a:ext>
+            </a:extLst>
+          </p:cNvPr>
+          <p:cNvSpPr/>
+          <p:nvPr/>
+        </p:nvSpPr>
+        <p:spPr>
+          <a:xfrm>
+            <a:off x="96253" y="6416842"/>
+            <a:ext cx="320842" cy="320842"/>
+          </a:xfrm>
+          <a:prstGeom prst="donut">
+            <a:avLst/>
+          </a:prstGeom>
+        </p:spPr>
+        <p:style>
+          <a:lnRef idx="2">
+            <a:schemeClr val="accent1">
+              <a:shade val="50000"/>
+            </a:schemeClr>
+          </a:lnRef>
+          <a:fillRef idx="1">
+            <a:schemeClr val="accent1"/>
+          </a:fillRef>
+          <a:effectRef idx="0">
+            <a:schemeClr val="accent1"/>
+          </a:effectRef>
+          <a:fontRef idx="minor">
+            <a:schemeClr val="lt1"/>
+          </a:fontRef>
+        </p:style>
+        <p:txBody>
+          <a:bodyPr rtlCol="0" anchor="ctr"/>
+          <a:lstStyle/>
+          <a:p>
+            <a:pPr algn="ctr"/>
+            <a:endParaRPr lang="en-CA">
+              <a:solidFill>
+                <a:schemeClr val="tx1"/>
+              </a:solidFill>
+            </a:endParaRPr>
+          </a:p>
+        </p:txBody>
+      </p:sp>
     </p:spTree>
     <p:extLst>
       <p:ext uri="{BB962C8B-B14F-4D97-AF65-F5344CB8AC3E}">
@@ -5155,15 +5255,7 @@
           <a:p>
             <a:r>
               <a:rPr lang="en-CA" dirty="0"/>
-              <a:t>For the FFT, an uneven delta-comb sampling window is </a:t>
-            </a:r>
-            <a:r>
-              <a:rPr lang="en-CA" dirty="0" err="1"/>
-              <a:t>unsymmetric</a:t>
-            </a:r>
-            <a:r>
-              <a:rPr lang="en-CA" dirty="0"/>
-              <a:t>, and has a noisy Fourier inverse. This gives a noisy result.</a:t>
+              <a:t>For the FFT, an uneven delta-comb sampling window is asymmetric, and has a noisy Fourier inverse. This gives a noisy result.</a:t>
             </a:r>
           </a:p>
           <a:p>
@@ -5214,6 +5306,56 @@
               <a:rPr lang="en-CA" dirty="0"/>
               <a:t> 2017</a:t>
             </a:r>
+          </a:p>
+        </p:txBody>
+      </p:sp>
+      <p:sp>
+        <p:nvSpPr>
+          <p:cNvPr id="8" name="Circle: Hollow 7">
+            <a:extLst>
+              <a:ext uri="{FF2B5EF4-FFF2-40B4-BE49-F238E27FC236}">
+                <a16:creationId xmlns:a16="http://schemas.microsoft.com/office/drawing/2014/main" id="{4FC9EE2E-4030-4491-BCC5-213CA38E068B}"/>
+              </a:ext>
+            </a:extLst>
+          </p:cNvPr>
+          <p:cNvSpPr/>
+          <p:nvPr/>
+        </p:nvSpPr>
+        <p:spPr>
+          <a:xfrm>
+            <a:off x="96253" y="6416842"/>
+            <a:ext cx="320842" cy="320842"/>
+          </a:xfrm>
+          <a:prstGeom prst="donut">
+            <a:avLst/>
+          </a:prstGeom>
+        </p:spPr>
+        <p:style>
+          <a:lnRef idx="2">
+            <a:schemeClr val="accent1">
+              <a:shade val="50000"/>
+            </a:schemeClr>
+          </a:lnRef>
+          <a:fillRef idx="1">
+            <a:schemeClr val="accent1"/>
+          </a:fillRef>
+          <a:effectRef idx="0">
+            <a:schemeClr val="accent1"/>
+          </a:effectRef>
+          <a:fontRef idx="minor">
+            <a:schemeClr val="lt1"/>
+          </a:fontRef>
+        </p:style>
+        <p:txBody>
+          <a:bodyPr rtlCol="0" anchor="ctr"/>
+          <a:lstStyle/>
+          <a:p>
+            <a:pPr algn="ctr"/>
+            <a:endParaRPr lang="en-CA">
+              <a:solidFill>
+                <a:schemeClr val="tx1"/>
+              </a:solidFill>
+            </a:endParaRPr>
           </a:p>
         </p:txBody>
       </p:sp>
@@ -5423,6 +5565,56 @@
           </a:prstGeom>
         </p:spPr>
       </p:pic>
+      <p:sp>
+        <p:nvSpPr>
+          <p:cNvPr id="7" name="Circle: Hollow 6">
+            <a:extLst>
+              <a:ext uri="{FF2B5EF4-FFF2-40B4-BE49-F238E27FC236}">
+                <a16:creationId xmlns:a16="http://schemas.microsoft.com/office/drawing/2014/main" id="{18434EBF-1062-4678-B9F8-30C4D9E0598B}"/>
+              </a:ext>
+            </a:extLst>
+          </p:cNvPr>
+          <p:cNvSpPr/>
+          <p:nvPr/>
+        </p:nvSpPr>
+        <p:spPr>
+          <a:xfrm>
+            <a:off x="96253" y="6416842"/>
+            <a:ext cx="320842" cy="320842"/>
+          </a:xfrm>
+          <a:prstGeom prst="donut">
+            <a:avLst/>
+          </a:prstGeom>
+        </p:spPr>
+        <p:style>
+          <a:lnRef idx="2">
+            <a:schemeClr val="accent1">
+              <a:shade val="50000"/>
+            </a:schemeClr>
+          </a:lnRef>
+          <a:fillRef idx="1">
+            <a:schemeClr val="accent1"/>
+          </a:fillRef>
+          <a:effectRef idx="0">
+            <a:schemeClr val="accent1"/>
+          </a:effectRef>
+          <a:fontRef idx="minor">
+            <a:schemeClr val="lt1"/>
+          </a:fontRef>
+        </p:style>
+        <p:txBody>
+          <a:bodyPr rtlCol="0" anchor="ctr"/>
+          <a:lstStyle/>
+          <a:p>
+            <a:pPr algn="ctr"/>
+            <a:endParaRPr lang="en-CA">
+              <a:solidFill>
+                <a:schemeClr val="tx1"/>
+              </a:solidFill>
+            </a:endParaRPr>
+          </a:p>
+        </p:txBody>
+      </p:sp>
     </p:spTree>
     <p:extLst>
       <p:ext uri="{BB962C8B-B14F-4D97-AF65-F5344CB8AC3E}">

</xml_diff>